<commit_message>
typos port 433 -> 443 new method of browsing from the portal
</commit_message>
<xml_diff>
--- a/Slides/Azure Data Factory Fundamentals Dag 2.pptx
+++ b/Slides/Azure Data Factory Fundamentals Dag 2.pptx
@@ -143,6 +143,48 @@
 </p:presentation>
 </file>
 
+<file path=ppt/changesInfos/changesInfo1.xml><?xml version="1.0" encoding="utf-8"?>
+<pc:chgInfo xmlns:a="http://schemas.openxmlformats.org/drawingml/2006/main" xmlns:r="http://schemas.openxmlformats.org/officeDocument/2006/relationships" xmlns:ac="http://schemas.microsoft.com/office/drawing/2013/main/command" xmlns:pc="http://schemas.microsoft.com/office/powerpoint/2013/main/command">
+  <pc:docChgLst>
+    <pc:chgData name="Jeroen Stork" userId="a67ece4a-3ffe-4d90-9e5a-14e6aaa6fbb3" providerId="ADAL" clId="{A91E9381-2812-4436-A77E-CCA9DEC3EBAB}"/>
+    <pc:docChg chg="modSld">
+      <pc:chgData name="Jeroen Stork" userId="a67ece4a-3ffe-4d90-9e5a-14e6aaa6fbb3" providerId="ADAL" clId="{A91E9381-2812-4436-A77E-CCA9DEC3EBAB}" dt="2023-05-08T22:15:13.125" v="8" actId="20577"/>
+      <pc:docMkLst>
+        <pc:docMk/>
+      </pc:docMkLst>
+      <pc:sldChg chg="modNotesTx">
+        <pc:chgData name="Jeroen Stork" userId="a67ece4a-3ffe-4d90-9e5a-14e6aaa6fbb3" providerId="ADAL" clId="{A91E9381-2812-4436-A77E-CCA9DEC3EBAB}" dt="2023-05-08T22:03:48.354" v="4" actId="20577"/>
+        <pc:sldMkLst>
+          <pc:docMk/>
+          <pc:sldMk cId="1326358123" sldId="301"/>
+        </pc:sldMkLst>
+      </pc:sldChg>
+      <pc:sldChg chg="modNotesTx">
+        <pc:chgData name="Jeroen Stork" userId="a67ece4a-3ffe-4d90-9e5a-14e6aaa6fbb3" providerId="ADAL" clId="{A91E9381-2812-4436-A77E-CCA9DEC3EBAB}" dt="2023-05-08T22:15:13.125" v="8" actId="20577"/>
+        <pc:sldMkLst>
+          <pc:docMk/>
+          <pc:sldMk cId="59472017" sldId="313"/>
+        </pc:sldMkLst>
+      </pc:sldChg>
+      <pc:sldChg chg="modNotesTx">
+        <pc:chgData name="Jeroen Stork" userId="a67ece4a-3ffe-4d90-9e5a-14e6aaa6fbb3" providerId="ADAL" clId="{A91E9381-2812-4436-A77E-CCA9DEC3EBAB}" dt="2023-05-08T22:07:54.760" v="6" actId="20577"/>
+        <pc:sldMkLst>
+          <pc:docMk/>
+          <pc:sldMk cId="458557915" sldId="316"/>
+        </pc:sldMkLst>
+      </pc:sldChg>
+      <pc:sldChg chg="modNotesTx">
+        <pc:chgData name="Jeroen Stork" userId="a67ece4a-3ffe-4d90-9e5a-14e6aaa6fbb3" providerId="ADAL" clId="{A91E9381-2812-4436-A77E-CCA9DEC3EBAB}" dt="2023-05-08T22:08:32.561" v="7" actId="20577"/>
+        <pc:sldMkLst>
+          <pc:docMk/>
+          <pc:sldMk cId="1065085013" sldId="318"/>
+        </pc:sldMkLst>
+      </pc:sldChg>
+    </pc:docChg>
+  </pc:docChgLst>
+</pc:chgInfo>
+</file>
+
 <file path=ppt/notesMasters/notesMaster1.xml><?xml version="1.0" encoding="utf-8"?>
 <p:notesMaster xmlns:a="http://schemas.openxmlformats.org/drawingml/2006/main" xmlns:r="http://schemas.openxmlformats.org/officeDocument/2006/relationships" xmlns:p="http://schemas.openxmlformats.org/presentationml/2006/main">
   <p:cSld>
@@ -225,7 +267,7 @@
           <a:p>
             <a:fld id="{506A7C9F-7078-400C-AFC7-04400CC6C0C9}" type="datetimeFigureOut">
               <a:rPr lang="nl-NL" smtClean="0"/>
-              <a:t>25-11-2021</a:t>
+              <a:t>9-5-2023</a:t>
             </a:fld>
             <a:endParaRPr lang="nl-NL"/>
           </a:p>
@@ -384,7 +426,7 @@
           <a:p>
             <a:fld id="{81639104-CD37-486E-9C7A-5184428EE9F5}" type="slidenum">
               <a:rPr lang="nl-NL" smtClean="0"/>
-              <a:t>‹nr.›</a:t>
+              <a:t>‹#›</a:t>
             </a:fld>
             <a:endParaRPr lang="nl-NL"/>
           </a:p>
@@ -2991,7 +3033,15 @@
             <a:pPr algn="l"/>
             <a:r>
               <a:rPr lang="nl-NL" dirty="0"/>
-              <a:t>Git is een gedistribueerd versiebeheersysteem. Elke ontwikkelaar heeft een kopie van de bronrepository op zijn ontwikkelmachine. Ontwikkelaars kunnen elke reeks wijzigingen op hun ontwikkelmachine doorvoeren en versiebeheerbewerkingen zoals geschiedenis uitvoeren en vergelijken zonder een netwerkverbinding. Takken zijn lichtgewicht. Wanneer u van context moet wisselen, kunt u een persoonlijke lokale vertakking maken. Je kunt snel van de ene branch naar de andere switchen om tussen verschillende variaties van je codebase te draaien. Later kunt je de vertakking samenvoegen, publiceren of verwijderen.</a:t>
+              <a:t>Git is een gedistribueerd versiebeheersysteem. Elke ontwikkelaar heeft een kopie van de bronrepository op zijn ontwikkelmachine. Ontwikkelaars kunnen elke reeks wijzigingen op hun ontwikkelmachine doorvoeren en versiebeheerbewerkingen zoals geschiedenis uitvoeren en vergelijken zonder een netwerkverbinding. </a:t>
+            </a:r>
+            <a:r>
+              <a:rPr lang="nl-NL"/>
+              <a:t>Taken </a:t>
+            </a:r>
+            <a:r>
+              <a:rPr lang="nl-NL" dirty="0"/>
+              <a:t>zijn lichtgewicht. Wanneer u van context moet wisselen, kunt u een persoonlijke lokale vertakking maken. Je kunt snel van de ene branch naar de andere switchen om tussen verschillende variaties van je codebase te draaien. Later kunt je de vertakking samenvoegen, publiceren of verwijderen.</a:t>
             </a:r>
           </a:p>
           <a:p>
@@ -3838,7 +3888,7 @@
                 <a:effectLst/>
                 <a:latin typeface="Segoe UI" panose="020B0502040204020203" pitchFamily="34" charset="0"/>
               </a:rPr>
-              <a:t>Enkele speerpunten van een DevOps-cultuur zijn: Samenwerken, zichtbaarheid en afstemming, Verandwoordelijke strekking en aansprakelijkheid, Korte releasecycles, Continue leren.</a:t>
+              <a:t>Enkele speerpunten van een DevOps-cultuur zijn: Samenwerken, zichtbaarheid en afstemming, Verantwoordelijke strekking en aansprakelijkheid, Korte releasecycles, Continue leren.</a:t>
             </a:r>
           </a:p>
           <a:p>
@@ -4069,7 +4119,15 @@
             </a:r>
             <a:r>
               <a:rPr lang="nl-NL" dirty="0"/>
-              <a:t> is de praktijk waarbij elke wijziging die in jecodebase wordt aangebracht, automatisch en zo vroeg mogelijk wordt getest. Continuous delivery volgt het testen dat plaatsvindt tijdens continue integratie en pusht wijzigingen in een staging- of productiesysteem. In Azure Data Factory betekent </a:t>
+              <a:t> is de praktijk waarbij elke wijziging die </a:t>
+            </a:r>
+            <a:r>
+              <a:rPr lang="nl-NL"/>
+              <a:t>in je codebase </a:t>
+            </a:r>
+            <a:r>
+              <a:rPr lang="nl-NL" dirty="0"/>
+              <a:t>wordt aangebracht, automatisch en zo vroeg mogelijk wordt getest. Continuous delivery volgt het testen dat plaatsvindt tijdens continue integratie en pusht wijzigingen in een staging- of productiesysteem. In Azure Data Factory betekent </a:t>
             </a:r>
             <a:r>
               <a:rPr lang="nl-NL" b="0" i="0" dirty="0">
@@ -6788,7 +6846,7 @@
                 <a:effectLst/>
                 <a:latin typeface="Segoe UI" panose="020B0502040204020203" pitchFamily="34" charset="0"/>
               </a:rPr>
-              <a:t>Controleactiviteiten bestaan uit zaken als: Een losse pipeline uitvoeren, variablen toepaasne, Filteren, ForEach loop, IF-Conditions, LoopUp, Wachten, Until en Web activiteten.</a:t>
+              <a:t>Controleactiviteiten bestaan uit zaken als: Een losse pipeline uitvoeren, variabelen toepassen, Filteren, ForEach loop, IF-Conditions, LoopUp, Wachten, Until en Web activiteten.</a:t>
             </a:r>
           </a:p>
           <a:p>
@@ -7014,7 +7072,7 @@
           <a:p>
             <a:fld id="{15E48C8E-5BC6-4622-8CA1-3638D2A56CDE}" type="datetimeFigureOut">
               <a:rPr lang="nl-NL" smtClean="0"/>
-              <a:t>25-11-2021</a:t>
+              <a:t>9-5-2023</a:t>
             </a:fld>
             <a:endParaRPr lang="nl-NL"/>
           </a:p>
@@ -7068,7 +7126,7 @@
           <a:p>
             <a:fld id="{4598FA16-D37F-4D9F-BE93-8104C2D892CA}" type="slidenum">
               <a:rPr lang="nl-NL" smtClean="0"/>
-              <a:t>‹nr.›</a:t>
+              <a:t>‹#›</a:t>
             </a:fld>
             <a:endParaRPr lang="nl-NL"/>
           </a:p>
@@ -7214,7 +7272,7 @@
           <a:p>
             <a:fld id="{15E48C8E-5BC6-4622-8CA1-3638D2A56CDE}" type="datetimeFigureOut">
               <a:rPr lang="nl-NL" smtClean="0"/>
-              <a:t>25-11-2021</a:t>
+              <a:t>9-5-2023</a:t>
             </a:fld>
             <a:endParaRPr lang="nl-NL"/>
           </a:p>
@@ -7268,7 +7326,7 @@
           <a:p>
             <a:fld id="{4598FA16-D37F-4D9F-BE93-8104C2D892CA}" type="slidenum">
               <a:rPr lang="nl-NL" smtClean="0"/>
-              <a:t>‹nr.›</a:t>
+              <a:t>‹#›</a:t>
             </a:fld>
             <a:endParaRPr lang="nl-NL"/>
           </a:p>
@@ -7424,7 +7482,7 @@
           <a:p>
             <a:fld id="{15E48C8E-5BC6-4622-8CA1-3638D2A56CDE}" type="datetimeFigureOut">
               <a:rPr lang="nl-NL" smtClean="0"/>
-              <a:t>25-11-2021</a:t>
+              <a:t>9-5-2023</a:t>
             </a:fld>
             <a:endParaRPr lang="nl-NL"/>
           </a:p>
@@ -7478,7 +7536,7 @@
           <a:p>
             <a:fld id="{4598FA16-D37F-4D9F-BE93-8104C2D892CA}" type="slidenum">
               <a:rPr lang="nl-NL" smtClean="0"/>
-              <a:t>‹nr.›</a:t>
+              <a:t>‹#›</a:t>
             </a:fld>
             <a:endParaRPr lang="nl-NL"/>
           </a:p>
@@ -7624,7 +7682,7 @@
           <a:p>
             <a:fld id="{15E48C8E-5BC6-4622-8CA1-3638D2A56CDE}" type="datetimeFigureOut">
               <a:rPr lang="nl-NL" smtClean="0"/>
-              <a:t>25-11-2021</a:t>
+              <a:t>9-5-2023</a:t>
             </a:fld>
             <a:endParaRPr lang="nl-NL"/>
           </a:p>
@@ -7678,7 +7736,7 @@
           <a:p>
             <a:fld id="{4598FA16-D37F-4D9F-BE93-8104C2D892CA}" type="slidenum">
               <a:rPr lang="nl-NL" smtClean="0"/>
-              <a:t>‹nr.›</a:t>
+              <a:t>‹#›</a:t>
             </a:fld>
             <a:endParaRPr lang="nl-NL"/>
           </a:p>
@@ -7900,7 +7958,7 @@
           <a:p>
             <a:fld id="{15E48C8E-5BC6-4622-8CA1-3638D2A56CDE}" type="datetimeFigureOut">
               <a:rPr lang="nl-NL" smtClean="0"/>
-              <a:t>25-11-2021</a:t>
+              <a:t>9-5-2023</a:t>
             </a:fld>
             <a:endParaRPr lang="nl-NL"/>
           </a:p>
@@ -7954,7 +8012,7 @@
           <a:p>
             <a:fld id="{4598FA16-D37F-4D9F-BE93-8104C2D892CA}" type="slidenum">
               <a:rPr lang="nl-NL" smtClean="0"/>
-              <a:t>‹nr.›</a:t>
+              <a:t>‹#›</a:t>
             </a:fld>
             <a:endParaRPr lang="nl-NL"/>
           </a:p>
@@ -8168,7 +8226,7 @@
           <a:p>
             <a:fld id="{15E48C8E-5BC6-4622-8CA1-3638D2A56CDE}" type="datetimeFigureOut">
               <a:rPr lang="nl-NL" smtClean="0"/>
-              <a:t>25-11-2021</a:t>
+              <a:t>9-5-2023</a:t>
             </a:fld>
             <a:endParaRPr lang="nl-NL"/>
           </a:p>
@@ -8222,7 +8280,7 @@
           <a:p>
             <a:fld id="{4598FA16-D37F-4D9F-BE93-8104C2D892CA}" type="slidenum">
               <a:rPr lang="nl-NL" smtClean="0"/>
-              <a:t>‹nr.›</a:t>
+              <a:t>‹#›</a:t>
             </a:fld>
             <a:endParaRPr lang="nl-NL"/>
           </a:p>
@@ -8583,7 +8641,7 @@
           <a:p>
             <a:fld id="{15E48C8E-5BC6-4622-8CA1-3638D2A56CDE}" type="datetimeFigureOut">
               <a:rPr lang="nl-NL" smtClean="0"/>
-              <a:t>25-11-2021</a:t>
+              <a:t>9-5-2023</a:t>
             </a:fld>
             <a:endParaRPr lang="nl-NL"/>
           </a:p>
@@ -8637,7 +8695,7 @@
           <a:p>
             <a:fld id="{4598FA16-D37F-4D9F-BE93-8104C2D892CA}" type="slidenum">
               <a:rPr lang="nl-NL" smtClean="0"/>
-              <a:t>‹nr.›</a:t>
+              <a:t>‹#›</a:t>
             </a:fld>
             <a:endParaRPr lang="nl-NL"/>
           </a:p>
@@ -8725,7 +8783,7 @@
           <a:p>
             <a:fld id="{15E48C8E-5BC6-4622-8CA1-3638D2A56CDE}" type="datetimeFigureOut">
               <a:rPr lang="nl-NL" smtClean="0"/>
-              <a:t>25-11-2021</a:t>
+              <a:t>9-5-2023</a:t>
             </a:fld>
             <a:endParaRPr lang="nl-NL"/>
           </a:p>
@@ -8779,7 +8837,7 @@
           <a:p>
             <a:fld id="{4598FA16-D37F-4D9F-BE93-8104C2D892CA}" type="slidenum">
               <a:rPr lang="nl-NL" smtClean="0"/>
-              <a:t>‹nr.›</a:t>
+              <a:t>‹#›</a:t>
             </a:fld>
             <a:endParaRPr lang="nl-NL"/>
           </a:p>
@@ -8838,7 +8896,7 @@
           <a:p>
             <a:fld id="{15E48C8E-5BC6-4622-8CA1-3638D2A56CDE}" type="datetimeFigureOut">
               <a:rPr lang="nl-NL" smtClean="0"/>
-              <a:t>25-11-2021</a:t>
+              <a:t>9-5-2023</a:t>
             </a:fld>
             <a:endParaRPr lang="nl-NL"/>
           </a:p>
@@ -8892,7 +8950,7 @@
           <a:p>
             <a:fld id="{4598FA16-D37F-4D9F-BE93-8104C2D892CA}" type="slidenum">
               <a:rPr lang="nl-NL" smtClean="0"/>
-              <a:t>‹nr.›</a:t>
+              <a:t>‹#›</a:t>
             </a:fld>
             <a:endParaRPr lang="nl-NL"/>
           </a:p>
@@ -9151,7 +9209,7 @@
           <a:p>
             <a:fld id="{15E48C8E-5BC6-4622-8CA1-3638D2A56CDE}" type="datetimeFigureOut">
               <a:rPr lang="nl-NL" smtClean="0"/>
-              <a:t>25-11-2021</a:t>
+              <a:t>9-5-2023</a:t>
             </a:fld>
             <a:endParaRPr lang="nl-NL"/>
           </a:p>
@@ -9205,7 +9263,7 @@
           <a:p>
             <a:fld id="{4598FA16-D37F-4D9F-BE93-8104C2D892CA}" type="slidenum">
               <a:rPr lang="nl-NL" smtClean="0"/>
-              <a:t>‹nr.›</a:t>
+              <a:t>‹#›</a:t>
             </a:fld>
             <a:endParaRPr lang="nl-NL"/>
           </a:p>
@@ -9440,7 +9498,7 @@
           <a:p>
             <a:fld id="{15E48C8E-5BC6-4622-8CA1-3638D2A56CDE}" type="datetimeFigureOut">
               <a:rPr lang="nl-NL" smtClean="0"/>
-              <a:t>25-11-2021</a:t>
+              <a:t>9-5-2023</a:t>
             </a:fld>
             <a:endParaRPr lang="nl-NL"/>
           </a:p>
@@ -9494,7 +9552,7 @@
           <a:p>
             <a:fld id="{4598FA16-D37F-4D9F-BE93-8104C2D892CA}" type="slidenum">
               <a:rPr lang="nl-NL" smtClean="0"/>
-              <a:t>‹nr.›</a:t>
+              <a:t>‹#›</a:t>
             </a:fld>
             <a:endParaRPr lang="nl-NL"/>
           </a:p>
@@ -9683,7 +9741,7 @@
           <a:p>
             <a:fld id="{15E48C8E-5BC6-4622-8CA1-3638D2A56CDE}" type="datetimeFigureOut">
               <a:rPr lang="nl-NL" smtClean="0"/>
-              <a:t>25-11-2021</a:t>
+              <a:t>9-5-2023</a:t>
             </a:fld>
             <a:endParaRPr lang="nl-NL"/>
           </a:p>
@@ -9773,7 +9831,7 @@
           <a:p>
             <a:fld id="{4598FA16-D37F-4D9F-BE93-8104C2D892CA}" type="slidenum">
               <a:rPr lang="nl-NL" smtClean="0"/>
-              <a:t>‹nr.›</a:t>
+              <a:t>‹#›</a:t>
             </a:fld>
             <a:endParaRPr lang="nl-NL"/>
           </a:p>

</xml_diff>